<commit_message>
Work in progress (3)
</commit_message>
<xml_diff>
--- a/design/Platform Design.pptx
+++ b/design/Platform Design.pptx
@@ -104,6 +104,11 @@
       </a:defRPr>
     </a:lvl9pPr>
   </p:defaultTextStyle>
+  <p:extLst>
+    <p:ext uri="{EFAFB233-063F-42B5-8137-9DF3F51BA10A}">
+      <p15:sldGuideLst xmlns:p15="http://schemas.microsoft.com/office/powerpoint/2012/main"/>
+    </p:ext>
+  </p:extLst>
 </p:presentation>
 </file>
 
@@ -254,7 +259,7 @@
           <a:p>
             <a:fld id="{6E46744B-D0F1-4EED-817E-143E9F43EDAA}" type="datetimeFigureOut">
               <a:rPr lang="fr-FR" smtClean="0"/>
-              <a:t>12/06/2021</a:t>
+              <a:t>15/06/2021</a:t>
             </a:fld>
             <a:endParaRPr lang="fr-FR"/>
           </a:p>
@@ -452,7 +457,7 @@
           <a:p>
             <a:fld id="{6E46744B-D0F1-4EED-817E-143E9F43EDAA}" type="datetimeFigureOut">
               <a:rPr lang="fr-FR" smtClean="0"/>
-              <a:t>12/06/2021</a:t>
+              <a:t>15/06/2021</a:t>
             </a:fld>
             <a:endParaRPr lang="fr-FR"/>
           </a:p>
@@ -660,7 +665,7 @@
           <a:p>
             <a:fld id="{6E46744B-D0F1-4EED-817E-143E9F43EDAA}" type="datetimeFigureOut">
               <a:rPr lang="fr-FR" smtClean="0"/>
-              <a:t>12/06/2021</a:t>
+              <a:t>15/06/2021</a:t>
             </a:fld>
             <a:endParaRPr lang="fr-FR"/>
           </a:p>
@@ -858,7 +863,7 @@
           <a:p>
             <a:fld id="{6E46744B-D0F1-4EED-817E-143E9F43EDAA}" type="datetimeFigureOut">
               <a:rPr lang="fr-FR" smtClean="0"/>
-              <a:t>12/06/2021</a:t>
+              <a:t>15/06/2021</a:t>
             </a:fld>
             <a:endParaRPr lang="fr-FR"/>
           </a:p>
@@ -1133,7 +1138,7 @@
           <a:p>
             <a:fld id="{6E46744B-D0F1-4EED-817E-143E9F43EDAA}" type="datetimeFigureOut">
               <a:rPr lang="fr-FR" smtClean="0"/>
-              <a:t>12/06/2021</a:t>
+              <a:t>15/06/2021</a:t>
             </a:fld>
             <a:endParaRPr lang="fr-FR"/>
           </a:p>
@@ -1398,7 +1403,7 @@
           <a:p>
             <a:fld id="{6E46744B-D0F1-4EED-817E-143E9F43EDAA}" type="datetimeFigureOut">
               <a:rPr lang="fr-FR" smtClean="0"/>
-              <a:t>12/06/2021</a:t>
+              <a:t>15/06/2021</a:t>
             </a:fld>
             <a:endParaRPr lang="fr-FR"/>
           </a:p>
@@ -1810,7 +1815,7 @@
           <a:p>
             <a:fld id="{6E46744B-D0F1-4EED-817E-143E9F43EDAA}" type="datetimeFigureOut">
               <a:rPr lang="fr-FR" smtClean="0"/>
-              <a:t>12/06/2021</a:t>
+              <a:t>15/06/2021</a:t>
             </a:fld>
             <a:endParaRPr lang="fr-FR"/>
           </a:p>
@@ -1951,7 +1956,7 @@
           <a:p>
             <a:fld id="{6E46744B-D0F1-4EED-817E-143E9F43EDAA}" type="datetimeFigureOut">
               <a:rPr lang="fr-FR" smtClean="0"/>
-              <a:t>12/06/2021</a:t>
+              <a:t>15/06/2021</a:t>
             </a:fld>
             <a:endParaRPr lang="fr-FR"/>
           </a:p>
@@ -2064,7 +2069,7 @@
           <a:p>
             <a:fld id="{6E46744B-D0F1-4EED-817E-143E9F43EDAA}" type="datetimeFigureOut">
               <a:rPr lang="fr-FR" smtClean="0"/>
-              <a:t>12/06/2021</a:t>
+              <a:t>15/06/2021</a:t>
             </a:fld>
             <a:endParaRPr lang="fr-FR"/>
           </a:p>
@@ -2375,7 +2380,7 @@
           <a:p>
             <a:fld id="{6E46744B-D0F1-4EED-817E-143E9F43EDAA}" type="datetimeFigureOut">
               <a:rPr lang="fr-FR" smtClean="0"/>
-              <a:t>12/06/2021</a:t>
+              <a:t>15/06/2021</a:t>
             </a:fld>
             <a:endParaRPr lang="fr-FR"/>
           </a:p>
@@ -2663,7 +2668,7 @@
           <a:p>
             <a:fld id="{6E46744B-D0F1-4EED-817E-143E9F43EDAA}" type="datetimeFigureOut">
               <a:rPr lang="fr-FR" smtClean="0"/>
-              <a:t>12/06/2021</a:t>
+              <a:t>15/06/2021</a:t>
             </a:fld>
             <a:endParaRPr lang="fr-FR"/>
           </a:p>
@@ -2904,7 +2909,7 @@
           <a:p>
             <a:fld id="{6E46744B-D0F1-4EED-817E-143E9F43EDAA}" type="datetimeFigureOut">
               <a:rPr lang="fr-FR" smtClean="0"/>
-              <a:t>12/06/2021</a:t>
+              <a:t>15/06/2021</a:t>
             </a:fld>
             <a:endParaRPr lang="fr-FR"/>
           </a:p>
@@ -8553,12 +8558,12 @@
           <a:p>
             <a:pPr algn="ctr"/>
             <a:r>
-              <a:rPr lang="fr-FR" sz="1400" dirty="0" err="1">
+              <a:rPr lang="fr-FR" sz="1400">
                 <a:solidFill>
                   <a:schemeClr val="tx1"/>
                 </a:solidFill>
               </a:rPr>
-              <a:t>Customers</a:t>
+              <a:t>Users</a:t>
             </a:r>
             <a:endParaRPr lang="fr-FR" sz="1400" dirty="0">
               <a:solidFill>
@@ -8766,12 +8771,12 @@
           <a:p>
             <a:pPr algn="ctr"/>
             <a:r>
-              <a:rPr lang="fr-FR" sz="1600" dirty="0">
+              <a:rPr lang="fr-FR" sz="1200" dirty="0">
                 <a:solidFill>
                   <a:schemeClr val="tx1"/>
                 </a:solidFill>
               </a:rPr>
-              <a:t>Solutions</a:t>
+              <a:t>Applications</a:t>
             </a:r>
           </a:p>
         </p:txBody>
@@ -10121,18 +10126,13 @@
           <a:p>
             <a:pPr algn="ctr"/>
             <a:r>
-              <a:rPr lang="fr-FR" sz="1200" dirty="0" err="1">
+              <a:rPr lang="fr-FR" sz="1200" dirty="0">
                 <a:solidFill>
                   <a:srgbClr val="FF0000"/>
                 </a:solidFill>
               </a:rPr>
-              <a:t>biz</a:t>
-            </a:r>
-            <a:endParaRPr lang="fr-FR" sz="1200" dirty="0">
-              <a:solidFill>
-                <a:srgbClr val="FF0000"/>
-              </a:solidFill>
-            </a:endParaRPr>
+              <a:t>business</a:t>
+            </a:r>
           </a:p>
         </p:txBody>
       </p:sp>
@@ -10263,7 +10263,7 @@
                   <a:srgbClr val="FF0000"/>
                 </a:solidFill>
               </a:rPr>
-              <a:t>app</a:t>
+              <a:t>apps</a:t>
             </a:r>
           </a:p>
         </p:txBody>
@@ -10324,13 +10324,18 @@
           <a:p>
             <a:pPr algn="ctr"/>
             <a:r>
-              <a:rPr lang="fr-FR" sz="1200" dirty="0">
+              <a:rPr lang="fr-FR" sz="1200" dirty="0" err="1">
                 <a:solidFill>
                   <a:srgbClr val="FF0000"/>
                 </a:solidFill>
               </a:rPr>
-              <a:t>dev</a:t>
-            </a:r>
+              <a:t>projects</a:t>
+            </a:r>
+            <a:endParaRPr lang="fr-FR" sz="1200" dirty="0">
+              <a:solidFill>
+                <a:srgbClr val="FF0000"/>
+              </a:solidFill>
+            </a:endParaRPr>
           </a:p>
         </p:txBody>
       </p:sp>
@@ -10390,14 +10395,14 @@
           <a:p>
             <a:pPr algn="ctr"/>
             <a:r>
-              <a:rPr lang="fr-FR" sz="1200" dirty="0" err="1">
+              <a:rPr lang="fr-FR" sz="1000" dirty="0" err="1">
                 <a:solidFill>
                   <a:srgbClr val="FF0000"/>
                 </a:solidFill>
               </a:rPr>
-              <a:t>env</a:t>
-            </a:r>
-            <a:endParaRPr lang="fr-FR" sz="1200" dirty="0">
+              <a:t>operations</a:t>
+            </a:r>
+            <a:endParaRPr lang="fr-FR" sz="1000" dirty="0">
               <a:solidFill>
                 <a:srgbClr val="FF0000"/>
               </a:solidFill>
@@ -10466,7 +10471,73 @@
                   <a:srgbClr val="FF0000"/>
                 </a:solidFill>
               </a:rPr>
-              <a:t>use</a:t>
+              <a:t>teams</a:t>
+            </a:r>
+          </a:p>
+        </p:txBody>
+      </p:sp>
+      <p:sp>
+        <p:nvSpPr>
+          <p:cNvPr id="169" name="Rectangle 168">
+            <a:extLst>
+              <a:ext uri="{FF2B5EF4-FFF2-40B4-BE49-F238E27FC236}">
+                <a16:creationId xmlns:a16="http://schemas.microsoft.com/office/drawing/2014/main" id="{2F03FC34-DCF8-40C8-A608-541E14CC005F}"/>
+              </a:ext>
+            </a:extLst>
+          </p:cNvPr>
+          <p:cNvSpPr/>
+          <p:nvPr/>
+        </p:nvSpPr>
+        <p:spPr>
+          <a:xfrm>
+            <a:off x="12014475" y="911110"/>
+            <a:ext cx="745180" cy="219049"/>
+          </a:xfrm>
+          <a:prstGeom prst="rect">
+            <a:avLst/>
+          </a:prstGeom>
+          <a:solidFill>
+            <a:schemeClr val="accent2">
+              <a:lumMod val="20000"/>
+              <a:lumOff val="80000"/>
+            </a:schemeClr>
+          </a:solidFill>
+          <a:ln>
+            <a:solidFill>
+              <a:schemeClr val="accent1">
+                <a:lumMod val="50000"/>
+              </a:schemeClr>
+            </a:solidFill>
+          </a:ln>
+        </p:spPr>
+        <p:style>
+          <a:lnRef idx="2">
+            <a:schemeClr val="accent1">
+              <a:shade val="50000"/>
+            </a:schemeClr>
+          </a:lnRef>
+          <a:fillRef idx="1">
+            <a:schemeClr val="accent1"/>
+          </a:fillRef>
+          <a:effectRef idx="0">
+            <a:schemeClr val="accent1"/>
+          </a:effectRef>
+          <a:fontRef idx="minor">
+            <a:schemeClr val="lt1"/>
+          </a:fontRef>
+        </p:style>
+        <p:txBody>
+          <a:bodyPr rtlCol="0" anchor="ctr"/>
+          <a:lstStyle/>
+          <a:p>
+            <a:pPr algn="ctr"/>
+            <a:r>
+              <a:rPr lang="fr-FR" sz="1200" dirty="0">
+                <a:solidFill>
+                  <a:srgbClr val="FF0000"/>
+                </a:solidFill>
+              </a:rPr>
+              <a:t>api</a:t>
             </a:r>
           </a:p>
         </p:txBody>

</xml_diff>